<commit_message>
Proofreading, added slide on Java sources.
</commit_message>
<xml_diff>
--- a/presentationSlides3.pptx
+++ b/presentationSlides3.pptx
@@ -5,10 +5,10 @@
     <p:sldMasterId id="2147483839" r:id="rId1"/>
   </p:sldMasterIdLst>
   <p:notesMasterIdLst>
-    <p:notesMasterId r:id="rId14"/>
+    <p:notesMasterId r:id="rId15"/>
   </p:notesMasterIdLst>
   <p:handoutMasterIdLst>
-    <p:handoutMasterId r:id="rId15"/>
+    <p:handoutMasterId r:id="rId16"/>
   </p:handoutMasterIdLst>
   <p:sldIdLst>
     <p:sldId id="256" r:id="rId2"/>
@@ -20,9 +20,10 @@
     <p:sldId id="263" r:id="rId8"/>
     <p:sldId id="260" r:id="rId9"/>
     <p:sldId id="261" r:id="rId10"/>
-    <p:sldId id="267" r:id="rId11"/>
-    <p:sldId id="266" r:id="rId12"/>
-    <p:sldId id="262" r:id="rId13"/>
+    <p:sldId id="268" r:id="rId11"/>
+    <p:sldId id="267" r:id="rId12"/>
+    <p:sldId id="266" r:id="rId13"/>
+    <p:sldId id="262" r:id="rId14"/>
   </p:sldIdLst>
   <p:sldSz cx="10080625" cy="7559675"/>
   <p:notesSz cx="7772400" cy="10058400"/>
@@ -880,7 +881,7 @@
 <dgm:dataModel xmlns:dgm="http://schemas.openxmlformats.org/drawingml/2006/diagram" xmlns:a="http://schemas.openxmlformats.org/drawingml/2006/main">
   <dgm:ptLst>
     <dgm:pt modelId="{FA22B1C4-2EB4-4709-B2B7-751708137984}" type="doc">
-      <dgm:prSet loTypeId="urn:microsoft.com/office/officeart/2008/layout/LinedList" loCatId="list" qsTypeId="urn:microsoft.com/office/officeart/2005/8/quickstyle/simple2" qsCatId="simple" csTypeId="urn:microsoft.com/office/officeart/2005/8/colors/accent3_2" csCatId="accent3"/>
+      <dgm:prSet loTypeId="urn:microsoft.com/office/officeart/2008/layout/LinedList" loCatId="list" qsTypeId="urn:microsoft.com/office/officeart/2005/8/quickstyle/simple2" qsCatId="simple" csTypeId="urn:microsoft.com/office/officeart/2005/8/colors/accent3_2" csCatId="accent3" phldr="1"/>
       <dgm:spPr/>
       <dgm:t>
         <a:bodyPr/>
@@ -898,7 +899,7 @@
         <a:lstStyle/>
         <a:p>
           <a:r>
-            <a:rPr lang="en-US"/>
+            <a:rPr lang="en-US" dirty="0"/>
             <a:t>Aaron Patula</a:t>
           </a:r>
         </a:p>
@@ -1195,7 +1196,7 @@
             <a:buNone/>
           </a:pPr>
           <a:r>
-            <a:rPr lang="en-US" sz="3400" kern="1200"/>
+            <a:rPr lang="en-US" sz="3400" kern="1200" dirty="0"/>
             <a:t>Aaron Patula</a:t>
           </a:r>
         </a:p>
@@ -3793,7 +3794,7 @@
             <a:pPr lvl="0"/>
             <a:fld id="{80923FD0-E349-4EFB-B4FF-16F06AF1FCB2}" type="slidenum">
               <a:rPr lang="en-US" smtClean="0"/>
-              <a:t>11</a:t>
+              <a:t>12</a:t>
             </a:fld>
             <a:endParaRPr lang="en-US"/>
           </a:p>
@@ -3856,7 +3857,7 @@
           <a:p>
             <a:pPr lvl="0"/>
             <a:fld id="{4F70C0C8-E435-4137-91AF-3FA2CD67DEBC}" type="slidenum">
-              <a:t>12</a:t>
+              <a:t>13</a:t>
             </a:fld>
             <a:endParaRPr lang="en-US"/>
           </a:p>
@@ -4743,6 +4744,89 @@
             </a:r>
           </a:p>
           <a:p>
+            <a:pPr marL="216000" marR="0" lvl="0" indent="-216000" defTabSz="914400" rtl="0" eaLnBrk="1" fontAlgn="auto" latinLnBrk="0" hangingPunct="0">
+              <a:lnSpc>
+                <a:spcPct val="100000"/>
+              </a:lnSpc>
+              <a:spcBef>
+                <a:spcPts val="0"/>
+              </a:spcBef>
+              <a:spcAft>
+                <a:spcPts val="0"/>
+              </a:spcAft>
+              <a:buClrTx/>
+              <a:buSzTx/>
+              <a:buFontTx/>
+              <a:buNone/>
+              <a:tabLst/>
+              <a:defRPr/>
+            </a:pPr>
+            <a:r>
+              <a:rPr lang="en-US" sz="2000" dirty="0">
+                <a:latin typeface="Liberation Sans" pitchFamily="18"/>
+              </a:rPr>
+              <a:t>you recall info in the context in which it is studied</a:t>
+            </a:r>
+          </a:p>
+          <a:p>
+            <a:pPr marL="216000" marR="0" lvl="0" indent="-216000" defTabSz="914400" rtl="0" eaLnBrk="1" fontAlgn="auto" latinLnBrk="0" hangingPunct="0">
+              <a:lnSpc>
+                <a:spcPct val="100000"/>
+              </a:lnSpc>
+              <a:spcBef>
+                <a:spcPts val="0"/>
+              </a:spcBef>
+              <a:spcAft>
+                <a:spcPts val="0"/>
+              </a:spcAft>
+              <a:buClrTx/>
+              <a:buSzTx/>
+              <a:buFontTx/>
+              <a:buNone/>
+              <a:tabLst/>
+              <a:defRPr/>
+            </a:pPr>
+            <a:r>
+              <a:rPr lang="en-US" sz="2000" dirty="0">
+                <a:highlight>
+                  <a:scrgbClr r="0" g="0" b="0">
+                    <a:alpha val="0"/>
+                  </a:scrgbClr>
+                </a:highlight>
+                <a:latin typeface="Calibri" panose="020F0502020204030204" pitchFamily="34" charset="0"/>
+                <a:cs typeface="Calibri" panose="020F0502020204030204" pitchFamily="34" charset="0"/>
+              </a:rPr>
+              <a:t>Start at the API and corner cases</a:t>
+            </a:r>
+          </a:p>
+          <a:p>
+            <a:pPr marL="216000" marR="0" lvl="0" indent="-216000" defTabSz="914400" rtl="0" eaLnBrk="1" fontAlgn="auto" latinLnBrk="0" hangingPunct="0">
+              <a:lnSpc>
+                <a:spcPct val="100000"/>
+              </a:lnSpc>
+              <a:spcBef>
+                <a:spcPts val="0"/>
+              </a:spcBef>
+              <a:spcAft>
+                <a:spcPts val="0"/>
+              </a:spcAft>
+              <a:buClrTx/>
+              <a:buSzTx/>
+              <a:buFontTx/>
+              <a:buNone/>
+              <a:tabLst/>
+              <a:defRPr/>
+            </a:pPr>
+            <a:endParaRPr lang="en-US" sz="2000" dirty="0">
+              <a:highlight>
+                <a:scrgbClr r="0" g="0" b="0">
+                  <a:alpha val="0"/>
+                </a:scrgbClr>
+              </a:highlight>
+              <a:latin typeface="Liberation Sans" pitchFamily="18"/>
+            </a:endParaRPr>
+          </a:p>
+          <a:p>
             <a:endParaRPr lang="en-US" dirty="0"/>
           </a:p>
         </p:txBody>
@@ -4989,6 +5073,38 @@
               </a:rPr>
               <a:t>with you taking the initiative as opposed to you getting the answer right</a:t>
             </a:r>
+          </a:p>
+          <a:p>
+            <a:pPr marL="216000" marR="0" lvl="0" indent="-216000" defTabSz="914400" rtl="0" eaLnBrk="1" fontAlgn="auto" latinLnBrk="0" hangingPunct="0">
+              <a:lnSpc>
+                <a:spcPct val="100000"/>
+              </a:lnSpc>
+              <a:spcBef>
+                <a:spcPts val="0"/>
+              </a:spcBef>
+              <a:spcAft>
+                <a:spcPts val="0"/>
+              </a:spcAft>
+              <a:buClrTx/>
+              <a:buSzTx/>
+              <a:buFontTx/>
+              <a:buNone/>
+              <a:tabLst/>
+              <a:defRPr/>
+            </a:pPr>
+            <a:r>
+              <a:rPr lang="en-US" sz="2000" dirty="0">
+                <a:highlight>
+                  <a:scrgbClr r="0" g="0" b="0">
+                    <a:alpha val="0"/>
+                  </a:scrgbClr>
+                </a:highlight>
+              </a:rPr>
+              <a:t>Understand the basics well</a:t>
+            </a:r>
+          </a:p>
+          <a:p>
+            <a:pPr lvl="0"/>
             <a:endParaRPr lang="en-US" dirty="0"/>
           </a:p>
         </p:txBody>
@@ -5104,7 +5220,76 @@
           <a:bodyPr/>
           <a:lstStyle/>
           <a:p>
-            <a:endParaRPr lang="en-US"/>
+            <a:r>
+              <a:rPr lang="en-US" dirty="0">
+                <a:highlight>
+                  <a:scrgbClr r="0" g="0" b="0">
+                    <a:alpha val="0"/>
+                  </a:scrgbClr>
+                </a:highlight>
+              </a:rPr>
+              <a:t>public char[] toCharArray()</a:t>
+            </a:r>
+            <a:r>
+              <a:rPr lang="en-US" sz="2000" b="0" i="0" u="none" strike="noStrike" kern="1200" cap="none" dirty="0">
+                <a:ln>
+                  <a:noFill/>
+                </a:ln>
+                <a:effectLst/>
+                <a:highlight>
+                  <a:scrgbClr r="0" g="0" b="0">
+                    <a:alpha val="0"/>
+                  </a:scrgbClr>
+                </a:highlight>
+                <a:latin typeface="Liberation Sans" pitchFamily="18"/>
+              </a:rPr>
+              <a:t>Converts this string to a new character array.</a:t>
+            </a:r>
+          </a:p>
+          <a:p>
+            <a:r>
+              <a:rPr lang="en-US" b="1" dirty="0" err="1">
+                <a:effectLst/>
+                <a:highlight>
+                  <a:scrgbClr r="0" g="0" b="0">
+                    <a:alpha val="0"/>
+                  </a:scrgbClr>
+                </a:highlight>
+              </a:rPr>
+              <a:t>Returns:</a:t>
+            </a:r>
+            <a:r>
+              <a:rPr lang="en-US" dirty="0" err="1">
+                <a:highlight>
+                  <a:scrgbClr r="0" g="0" b="0">
+                    <a:alpha val="0"/>
+                  </a:scrgbClr>
+                </a:highlight>
+              </a:rPr>
+              <a:t>a</a:t>
+            </a:r>
+            <a:r>
+              <a:rPr lang="en-US" dirty="0">
+                <a:highlight>
+                  <a:scrgbClr r="0" g="0" b="0">
+                    <a:alpha val="0"/>
+                  </a:scrgbClr>
+                </a:highlight>
+              </a:rPr>
+              <a:t> newly allocated character array whose length is the length of this string and whose contents are initialized to contain the character sequence represented by this string.</a:t>
+            </a:r>
+          </a:p>
+          <a:p>
+            <a:endParaRPr lang="en-US" dirty="0">
+              <a:highlight>
+                <a:scrgbClr r="0" g="0" b="0">
+                  <a:alpha val="0"/>
+                </a:scrgbClr>
+              </a:highlight>
+            </a:endParaRPr>
+          </a:p>
+          <a:p>
+            <a:endParaRPr lang="en-US" dirty="0"/>
           </a:p>
         </p:txBody>
       </p:sp>
@@ -5166,12 +5351,8 @@
           <a:lstStyle/>
           <a:p>
             <a:r>
-              <a:rPr lang="en-US" dirty="0" err="1"/>
-              <a:t>Github</a:t>
-            </a:r>
-            <a:r>
               <a:rPr lang="en-US" dirty="0"/>
-              <a:t>, cloud, blog, twitter</a:t>
+              <a:t>Github, cloud, blog, twitter</a:t>
             </a:r>
           </a:p>
           <a:p>
@@ -5269,7 +5450,7 @@
             <a:pPr lvl="0"/>
             <a:fld id="{80923FD0-E349-4EFB-B4FF-16F06AF1FCB2}" type="slidenum">
               <a:rPr lang="en-US" smtClean="0"/>
-              <a:t>10</a:t>
+              <a:t>11</a:t>
             </a:fld>
             <a:endParaRPr lang="en-US"/>
           </a:p>
@@ -9296,8 +9477,8 @@
         </p:nvSpPr>
         <p:spPr>
           <a:xfrm>
-            <a:off x="394908" y="880099"/>
-            <a:ext cx="2550620" cy="3323892"/>
+            <a:off x="394907" y="880099"/>
+            <a:ext cx="2594477" cy="3323892"/>
           </a:xfrm>
         </p:spPr>
         <p:txBody>
@@ -9386,13 +9567,13 @@
           <p:nvPr>
             <p:extLst>
               <p:ext uri="{D42A27DB-BD31-4B8C-83A1-F6EECF244321}">
-                <p14:modId xmlns:p14="http://schemas.microsoft.com/office/powerpoint/2010/main" val="2702440363"/>
+                <p14:modId xmlns:p14="http://schemas.microsoft.com/office/powerpoint/2010/main" val="2392075869"/>
               </p:ext>
             </p:extLst>
           </p:nvPr>
         </p:nvGraphicFramePr>
         <p:xfrm>
-          <a:off x="3607276" y="84779"/>
+          <a:off x="3607276" y="689690"/>
           <a:ext cx="5620474" cy="5286070"/>
         </p:xfrm>
         <a:graphic>
@@ -9428,189 +9609,148 @@
       </p:grpSpPr>
       <p:sp>
         <p:nvSpPr>
-          <p:cNvPr id="2" name="Title 1">
+          <p:cNvPr id="4" name="Rectangle 3">
             <a:extLst>
               <a:ext uri="{FF2B5EF4-FFF2-40B4-BE49-F238E27FC236}">
-                <a16:creationId xmlns:a16="http://schemas.microsoft.com/office/drawing/2014/main" id="{1DD7B33F-B2D7-49C5-A92B-A2C79F8ADB9B}"/>
+                <a16:creationId xmlns:a16="http://schemas.microsoft.com/office/drawing/2014/main" id="{E205A51A-2E33-4A06-9C17-876BC8265C87}"/>
               </a:ext>
             </a:extLst>
           </p:cNvPr>
-          <p:cNvSpPr>
-            <a:spLocks noGrp="1"/>
-          </p:cNvSpPr>
-          <p:nvPr>
-            <p:ph type="title" idx="4294967295"/>
-          </p:nvPr>
+          <p:cNvSpPr/>
+          <p:nvPr/>
         </p:nvSpPr>
         <p:spPr>
           <a:xfrm>
-            <a:off x="225083" y="241276"/>
-            <a:ext cx="8316913" cy="1598612"/>
+            <a:off x="298255" y="1311020"/>
+            <a:ext cx="7966515" cy="3693319"/>
           </a:xfrm>
+          <a:prstGeom prst="rect">
+            <a:avLst/>
+          </a:prstGeom>
         </p:spPr>
         <p:txBody>
-          <a:bodyPr/>
+          <a:bodyPr wrap="square">
+            <a:spAutoFit/>
+          </a:bodyPr>
           <a:lstStyle/>
           <a:p>
             <a:r>
-              <a:rPr lang="en-US" sz="4800" dirty="0"/>
-              <a:t>What Interviewers </a:t>
-            </a:r>
-            <a:br>
-              <a:rPr lang="en-US" sz="4800" dirty="0"/>
-            </a:br>
-            <a:r>
-              <a:rPr lang="en-US" sz="4800" dirty="0"/>
-              <a:t>Really Want</a:t>
-            </a:r>
-            <a:endParaRPr lang="en-US" dirty="0"/>
+              <a:rPr lang="en-US" dirty="0"/>
+              <a:t> /**</a:t>
+            </a:r>
+          </a:p>
+          <a:p>
+            <a:r>
+              <a:rPr lang="en-US" dirty="0"/>
+              <a:t>     * Converts this string to a new character array.</a:t>
+            </a:r>
+          </a:p>
+          <a:p>
+            <a:r>
+              <a:rPr lang="en-US" dirty="0"/>
+              <a:t>     *</a:t>
+            </a:r>
+          </a:p>
+          <a:p>
+            <a:r>
+              <a:rPr lang="en-US" dirty="0"/>
+              <a:t>     * @return  a newly allocated character array whose length is the length</a:t>
+            </a:r>
+          </a:p>
+          <a:p>
+            <a:r>
+              <a:rPr lang="en-US" dirty="0"/>
+              <a:t>     *          of this string and whose contents are initialized to contain</a:t>
+            </a:r>
+          </a:p>
+          <a:p>
+            <a:r>
+              <a:rPr lang="en-US" dirty="0"/>
+              <a:t>     *          the character sequence represented by this string.</a:t>
+            </a:r>
+          </a:p>
+          <a:p>
+            <a:r>
+              <a:rPr lang="en-US" dirty="0"/>
+              <a:t>     */</a:t>
+            </a:r>
+          </a:p>
+          <a:p>
+            <a:r>
+              <a:rPr lang="en-US" dirty="0"/>
+              <a:t>    public char[] toCharArray() {</a:t>
+            </a:r>
+          </a:p>
+          <a:p>
+            <a:r>
+              <a:rPr lang="en-US" dirty="0"/>
+              <a:t>        // Cannot use Arrays.copyOf because of class initialization order issues</a:t>
+            </a:r>
+          </a:p>
+          <a:p>
+            <a:r>
+              <a:rPr lang="en-US" dirty="0"/>
+              <a:t>        char result[] = new char[value.length];</a:t>
+            </a:r>
+          </a:p>
+          <a:p>
+            <a:r>
+              <a:rPr lang="en-US" dirty="0"/>
+              <a:t>        System.arraycopy(value, 0, result, 0, value.length);</a:t>
+            </a:r>
+          </a:p>
+          <a:p>
+            <a:r>
+              <a:rPr lang="en-US" dirty="0"/>
+              <a:t>        return result;</a:t>
+            </a:r>
+          </a:p>
+          <a:p>
+            <a:r>
+              <a:rPr lang="en-US" dirty="0"/>
+              <a:t>    }</a:t>
+            </a:r>
           </a:p>
         </p:txBody>
       </p:sp>
       <p:sp>
         <p:nvSpPr>
-          <p:cNvPr id="3" name="Content Placeholder 2">
+          <p:cNvPr id="5" name="Rectangle 4">
             <a:extLst>
               <a:ext uri="{FF2B5EF4-FFF2-40B4-BE49-F238E27FC236}">
-                <a16:creationId xmlns:a16="http://schemas.microsoft.com/office/drawing/2014/main" id="{CCC45320-73DC-49C2-8410-863AC44C60F5}"/>
+                <a16:creationId xmlns:a16="http://schemas.microsoft.com/office/drawing/2014/main" id="{4EE1D41C-9AB4-46E5-B7C1-2CD6A1509CE5}"/>
               </a:ext>
             </a:extLst>
           </p:cNvPr>
-          <p:cNvSpPr>
-            <a:spLocks noGrp="1"/>
-          </p:cNvSpPr>
-          <p:nvPr>
-            <p:ph idx="4294967295"/>
-          </p:nvPr>
+          <p:cNvSpPr/>
+          <p:nvPr/>
         </p:nvSpPr>
         <p:spPr>
           <a:xfrm>
-            <a:off x="386862" y="1964079"/>
-            <a:ext cx="8316913" cy="4435475"/>
+            <a:off x="197108" y="317400"/>
+            <a:ext cx="7416774" cy="646331"/>
           </a:xfrm>
+          <a:prstGeom prst="rect">
+            <a:avLst/>
+          </a:prstGeom>
         </p:spPr>
         <p:txBody>
-          <a:bodyPr>
-            <a:normAutofit/>
+          <a:bodyPr wrap="none">
+            <a:spAutoFit/>
           </a:bodyPr>
           <a:lstStyle/>
           <a:p>
-            <a:pPr>
-              <a:buFont typeface="Arial" panose="020B0604020202020204" pitchFamily="34" charset="0"/>
-              <a:buChar char="•"/>
-            </a:pPr>
-            <a:r>
-              <a:rPr lang="en-US" dirty="0"/>
-              <a:t> </a:t>
-            </a:r>
-            <a:r>
-              <a:rPr lang="en-US" sz="2800" dirty="0"/>
-              <a:t>How you solve the coding problem</a:t>
-            </a:r>
-          </a:p>
-          <a:p>
-            <a:pPr marL="665442" lvl="1" indent="-342900">
-              <a:buFontTx/>
-              <a:buChar char="-"/>
-            </a:pPr>
-            <a:r>
-              <a:rPr lang="en-US" sz="2400" dirty="0"/>
-              <a:t>State problem, API first, talk through algorithm</a:t>
-            </a:r>
-          </a:p>
-          <a:p>
-            <a:pPr marL="665442" lvl="1" indent="-342900">
-              <a:buFontTx/>
-              <a:buChar char="-"/>
-            </a:pPr>
-            <a:r>
-              <a:rPr lang="en-US" sz="2400" dirty="0"/>
-              <a:t>Corner cases, ‘fail the test’</a:t>
-            </a:r>
-          </a:p>
-          <a:p>
-            <a:pPr marL="665442" lvl="1" indent="-342900">
-              <a:buFontTx/>
-              <a:buChar char="-"/>
-            </a:pPr>
-            <a:r>
-              <a:rPr lang="en-US" sz="2400" dirty="0"/>
-              <a:t>Don’t freeze, make progress</a:t>
-            </a:r>
-          </a:p>
-          <a:p>
-            <a:pPr marL="665442" lvl="1" indent="-342900">
-              <a:buFontTx/>
-              <a:buChar char="-"/>
-            </a:pPr>
-            <a:r>
-              <a:rPr lang="en-US" sz="2400" dirty="0"/>
-              <a:t>Improve algorithms, refactor</a:t>
-            </a:r>
-          </a:p>
-          <a:p>
-            <a:pPr marL="665442" lvl="1" indent="-342900">
-              <a:buFontTx/>
-              <a:buChar char="-"/>
-            </a:pPr>
-            <a:r>
-              <a:rPr lang="en-US" sz="2400" dirty="0"/>
-              <a:t>Space complexity vs time complexity tradeoff</a:t>
-            </a:r>
-          </a:p>
-          <a:p>
-            <a:pPr>
-              <a:buFont typeface="Arial" panose="020B0604020202020204" pitchFamily="34" charset="0"/>
-              <a:buChar char="•"/>
-            </a:pPr>
-            <a:r>
-              <a:rPr lang="en-US" dirty="0"/>
-              <a:t> </a:t>
-            </a:r>
-            <a:r>
-              <a:rPr lang="en-US" sz="2800" dirty="0"/>
-              <a:t>Talk tech</a:t>
-            </a:r>
-          </a:p>
-          <a:p>
-            <a:pPr marL="665442" lvl="1" indent="-342900">
-              <a:buClr>
-                <a:srgbClr val="E48312"/>
-              </a:buClr>
-              <a:buFontTx/>
-              <a:buChar char="-"/>
-            </a:pPr>
-            <a:r>
-              <a:rPr lang="en-US" sz="2400" dirty="0">
-                <a:solidFill>
-                  <a:srgbClr val="000000">
-                    <a:lumMod val="75000"/>
-                    <a:lumOff val="25000"/>
-                  </a:srgbClr>
-                </a:solidFill>
-              </a:rPr>
-              <a:t>Managerial or architectural view</a:t>
-            </a:r>
-            <a:endParaRPr lang="en-US" sz="2400" dirty="0"/>
-          </a:p>
-          <a:p>
-            <a:pPr marL="322542" lvl="1" indent="0">
-              <a:buNone/>
-            </a:pPr>
-            <a:endParaRPr lang="en-US" dirty="0"/>
-          </a:p>
-          <a:p>
-            <a:endParaRPr lang="en-US" dirty="0"/>
-          </a:p>
-          <a:p>
-            <a:endParaRPr lang="en-US" dirty="0"/>
+            <a:r>
+              <a:rPr lang="en-US" sz="3600" dirty="0"/>
+              <a:t>src/share/classes/java/lang/String.java</a:t>
+            </a:r>
           </a:p>
         </p:txBody>
       </p:sp>
     </p:spTree>
     <p:extLst>
       <p:ext uri="{BB962C8B-B14F-4D97-AF65-F5344CB8AC3E}">
-        <p14:creationId xmlns:p14="http://schemas.microsoft.com/office/powerpoint/2010/main" val="2566674287"/>
+        <p14:creationId xmlns:p14="http://schemas.microsoft.com/office/powerpoint/2010/main" val="893326491"/>
       </p:ext>
     </p:extLst>
   </p:cSld>
@@ -9642,6 +9782,217 @@
           <p:cNvPr id="2" name="Title 1">
             <a:extLst>
               <a:ext uri="{FF2B5EF4-FFF2-40B4-BE49-F238E27FC236}">
+                <a16:creationId xmlns:a16="http://schemas.microsoft.com/office/drawing/2014/main" id="{1DD7B33F-B2D7-49C5-A92B-A2C79F8ADB9B}"/>
+              </a:ext>
+            </a:extLst>
+          </p:cNvPr>
+          <p:cNvSpPr>
+            <a:spLocks noGrp="1"/>
+          </p:cNvSpPr>
+          <p:nvPr>
+            <p:ph type="title" idx="4294967295"/>
+          </p:nvPr>
+        </p:nvSpPr>
+        <p:spPr>
+          <a:xfrm>
+            <a:off x="225083" y="241276"/>
+            <a:ext cx="8316913" cy="1598612"/>
+          </a:xfrm>
+        </p:spPr>
+        <p:txBody>
+          <a:bodyPr/>
+          <a:lstStyle/>
+          <a:p>
+            <a:r>
+              <a:rPr lang="en-US" sz="4800" dirty="0"/>
+              <a:t>What Interviewers </a:t>
+            </a:r>
+            <a:br>
+              <a:rPr lang="en-US" sz="4800" dirty="0"/>
+            </a:br>
+            <a:r>
+              <a:rPr lang="en-US" sz="4800" dirty="0"/>
+              <a:t>Really Want</a:t>
+            </a:r>
+            <a:endParaRPr lang="en-US" dirty="0"/>
+          </a:p>
+        </p:txBody>
+      </p:sp>
+      <p:sp>
+        <p:nvSpPr>
+          <p:cNvPr id="3" name="Content Placeholder 2">
+            <a:extLst>
+              <a:ext uri="{FF2B5EF4-FFF2-40B4-BE49-F238E27FC236}">
+                <a16:creationId xmlns:a16="http://schemas.microsoft.com/office/drawing/2014/main" id="{CCC45320-73DC-49C2-8410-863AC44C60F5}"/>
+              </a:ext>
+            </a:extLst>
+          </p:cNvPr>
+          <p:cNvSpPr>
+            <a:spLocks noGrp="1"/>
+          </p:cNvSpPr>
+          <p:nvPr>
+            <p:ph idx="4294967295"/>
+          </p:nvPr>
+        </p:nvSpPr>
+        <p:spPr>
+          <a:xfrm>
+            <a:off x="386862" y="1964079"/>
+            <a:ext cx="8316913" cy="4435475"/>
+          </a:xfrm>
+        </p:spPr>
+        <p:txBody>
+          <a:bodyPr>
+            <a:normAutofit/>
+          </a:bodyPr>
+          <a:lstStyle/>
+          <a:p>
+            <a:pPr>
+              <a:buFont typeface="Arial" panose="020B0604020202020204" pitchFamily="34" charset="0"/>
+              <a:buChar char="•"/>
+            </a:pPr>
+            <a:r>
+              <a:rPr lang="en-US" dirty="0"/>
+              <a:t> </a:t>
+            </a:r>
+            <a:r>
+              <a:rPr lang="en-US" sz="2800" dirty="0"/>
+              <a:t>How you solve the coding problem</a:t>
+            </a:r>
+          </a:p>
+          <a:p>
+            <a:pPr marL="665442" lvl="1" indent="-342900">
+              <a:buFontTx/>
+              <a:buChar char="-"/>
+            </a:pPr>
+            <a:r>
+              <a:rPr lang="en-US" sz="2400" dirty="0"/>
+              <a:t>State problem, API first, talk through algorithm</a:t>
+            </a:r>
+          </a:p>
+          <a:p>
+            <a:pPr marL="665442" lvl="1" indent="-342900">
+              <a:buFontTx/>
+              <a:buChar char="-"/>
+            </a:pPr>
+            <a:r>
+              <a:rPr lang="en-US" sz="2400" dirty="0"/>
+              <a:t>Corner cases, ‘fail the test’</a:t>
+            </a:r>
+          </a:p>
+          <a:p>
+            <a:pPr marL="665442" lvl="1" indent="-342900">
+              <a:buFontTx/>
+              <a:buChar char="-"/>
+            </a:pPr>
+            <a:r>
+              <a:rPr lang="en-US" sz="2400" dirty="0"/>
+              <a:t>Don’t freeze, make progress</a:t>
+            </a:r>
+          </a:p>
+          <a:p>
+            <a:pPr marL="665442" lvl="1" indent="-342900">
+              <a:buFontTx/>
+              <a:buChar char="-"/>
+            </a:pPr>
+            <a:r>
+              <a:rPr lang="en-US" sz="2400" dirty="0"/>
+              <a:t>Improve algorithms, refactor</a:t>
+            </a:r>
+          </a:p>
+          <a:p>
+            <a:pPr marL="665442" lvl="1" indent="-342900">
+              <a:buFontTx/>
+              <a:buChar char="-"/>
+            </a:pPr>
+            <a:r>
+              <a:rPr lang="en-US" sz="2400" dirty="0"/>
+              <a:t>Space complexity vs time complexity tradeoff</a:t>
+            </a:r>
+          </a:p>
+          <a:p>
+            <a:pPr>
+              <a:buFont typeface="Arial" panose="020B0604020202020204" pitchFamily="34" charset="0"/>
+              <a:buChar char="•"/>
+            </a:pPr>
+            <a:r>
+              <a:rPr lang="en-US" dirty="0"/>
+              <a:t> </a:t>
+            </a:r>
+            <a:r>
+              <a:rPr lang="en-US" sz="2800" dirty="0"/>
+              <a:t>Talk tech</a:t>
+            </a:r>
+          </a:p>
+          <a:p>
+            <a:pPr marL="665442" lvl="1" indent="-342900">
+              <a:buClr>
+                <a:srgbClr val="E48312"/>
+              </a:buClr>
+              <a:buFontTx/>
+              <a:buChar char="-"/>
+            </a:pPr>
+            <a:r>
+              <a:rPr lang="en-US" sz="2400" dirty="0">
+                <a:solidFill>
+                  <a:srgbClr val="000000">
+                    <a:lumMod val="75000"/>
+                    <a:lumOff val="25000"/>
+                  </a:srgbClr>
+                </a:solidFill>
+              </a:rPr>
+              <a:t>Managerial or architectural view</a:t>
+            </a:r>
+            <a:endParaRPr lang="en-US" sz="2400" dirty="0"/>
+          </a:p>
+          <a:p>
+            <a:pPr marL="322542" lvl="1" indent="0">
+              <a:buNone/>
+            </a:pPr>
+            <a:endParaRPr lang="en-US" dirty="0"/>
+          </a:p>
+          <a:p>
+            <a:endParaRPr lang="en-US" dirty="0"/>
+          </a:p>
+          <a:p>
+            <a:endParaRPr lang="en-US" dirty="0"/>
+          </a:p>
+        </p:txBody>
+      </p:sp>
+    </p:spTree>
+    <p:extLst>
+      <p:ext uri="{BB962C8B-B14F-4D97-AF65-F5344CB8AC3E}">
+        <p14:creationId xmlns:p14="http://schemas.microsoft.com/office/powerpoint/2010/main" val="2566674287"/>
+      </p:ext>
+    </p:extLst>
+  </p:cSld>
+  <p:clrMapOvr>
+    <a:masterClrMapping/>
+  </p:clrMapOvr>
+</p:sld>
+</file>
+
+<file path=ppt/slides/slide12.xml><?xml version="1.0" encoding="utf-8"?>
+<p:sld xmlns:a="http://schemas.openxmlformats.org/drawingml/2006/main" xmlns:r="http://schemas.openxmlformats.org/officeDocument/2006/relationships" xmlns:p="http://schemas.openxmlformats.org/presentationml/2006/main">
+  <p:cSld>
+    <p:spTree>
+      <p:nvGrpSpPr>
+        <p:cNvPr id="1" name=""/>
+        <p:cNvGrpSpPr/>
+        <p:nvPr/>
+      </p:nvGrpSpPr>
+      <p:grpSpPr>
+        <a:xfrm>
+          <a:off x="0" y="0"/>
+          <a:ext cx="0" cy="0"/>
+          <a:chOff x="0" y="0"/>
+          <a:chExt cx="0" cy="0"/>
+        </a:xfrm>
+      </p:grpSpPr>
+      <p:sp>
+        <p:nvSpPr>
+          <p:cNvPr id="2" name="Title 1">
+            <a:extLst>
+              <a:ext uri="{FF2B5EF4-FFF2-40B4-BE49-F238E27FC236}">
                 <a16:creationId xmlns:a16="http://schemas.microsoft.com/office/drawing/2014/main" id="{B8A68B68-C388-4C39-9897-5A09B36C1B6F}"/>
               </a:ext>
             </a:extLst>
@@ -9674,13 +10025,8 @@
             </a:br>
             <a:r>
               <a:rPr lang="en-US" sz="5400" dirty="0"/>
-              <a:t>Really Want </a:t>
-            </a:r>
-            <a:r>
-              <a:rPr lang="en-US" sz="5400" dirty="0" err="1"/>
-              <a:t>con’t</a:t>
-            </a:r>
-            <a:endParaRPr lang="en-US" sz="5400" dirty="0"/>
+              <a:t>Really Want cont.</a:t>
+            </a:r>
           </a:p>
         </p:txBody>
       </p:sp>
@@ -9720,13 +10066,8 @@
           <a:p>
             <a:r>
               <a:rPr lang="en-US" dirty="0"/>
-              <a:t>-- Jim </a:t>
-            </a:r>
-            <a:r>
-              <a:rPr lang="en-US" dirty="0" err="1"/>
-              <a:t>Rohn</a:t>
-            </a:r>
-            <a:endParaRPr lang="en-US" dirty="0"/>
+              <a:t>-- Jim Rohn</a:t>
+            </a:r>
           </a:p>
           <a:p>
             <a:endParaRPr lang="en-US" dirty="0"/>
@@ -9807,17 +10148,6 @@
               <a:buChar char="-"/>
             </a:pPr>
             <a:r>
-              <a:rPr lang="en-US" sz="2400" dirty="0" err="1">
-                <a:solidFill>
-                  <a:srgbClr val="000000">
-                    <a:lumMod val="75000"/>
-                    <a:lumOff val="25000"/>
-                  </a:srgbClr>
-                </a:solidFill>
-              </a:rPr>
-              <a:t>Github</a:t>
-            </a:r>
-            <a:r>
               <a:rPr lang="en-US" sz="2400" dirty="0">
                 <a:solidFill>
                   <a:srgbClr val="000000">
@@ -9826,7 +10156,7 @@
                   </a:srgbClr>
                 </a:solidFill>
               </a:rPr>
-              <a:t>, cloud, blog</a:t>
+              <a:t>Github, cloud, blog</a:t>
             </a:r>
           </a:p>
         </p:txBody>
@@ -9844,7 +10174,7 @@
 </p:sld>
 </file>
 
-<file path=ppt/slides/slide12.xml><?xml version="1.0" encoding="utf-8"?>
+<file path=ppt/slides/slide13.xml><?xml version="1.0" encoding="utf-8"?>
 <p:sld xmlns:a="http://schemas.openxmlformats.org/drawingml/2006/main" xmlns:r="http://schemas.openxmlformats.org/officeDocument/2006/relationships" xmlns:p="http://schemas.openxmlformats.org/presentationml/2006/main">
   <p:cSld name="page7">
     <p:spTree>
@@ -10013,15 +10343,7 @@
             </a:r>
             <a:r>
               <a:rPr lang="en-US" sz="2600" dirty="0"/>
-              <a:t>- </a:t>
-            </a:r>
-            <a:r>
-              <a:rPr lang="en-US" sz="2600" dirty="0" err="1"/>
-              <a:t>Graesser</a:t>
-            </a:r>
-            <a:r>
-              <a:rPr lang="en-US" sz="2600" dirty="0"/>
-              <a:t> and Franklin, </a:t>
+              <a:t>- Graesser and Franklin, </a:t>
             </a:r>
             <a:r>
               <a:rPr lang="en-US" sz="2600" i="1" dirty="0">
@@ -10041,15 +10363,7 @@
             </a:br>
             <a:r>
               <a:rPr lang="en-US" sz="2600" dirty="0"/>
-              <a:t>Takeaway- Automating a task through </a:t>
-            </a:r>
-            <a:r>
-              <a:rPr lang="en-US" sz="2600" dirty="0" err="1"/>
-              <a:t>overpractice</a:t>
-            </a:r>
-            <a:r>
-              <a:rPr lang="en-US" sz="2600" dirty="0"/>
-              <a:t> reduces load on the conscious attention needed for problem solving.</a:t>
+              <a:t>Takeaway- Automating a task through overpractice reduces load on the conscious attention needed for problem solving.</a:t>
             </a:r>
             <a:br>
               <a:rPr lang="en-US" sz="2600" dirty="0"/>
@@ -10656,13 +10970,8 @@
             <a:pPr lvl="0"/>
             <a:r>
               <a:rPr lang="en-US" sz="4800" dirty="0"/>
-              <a:t>Attention is Limited </a:t>
-            </a:r>
-            <a:r>
-              <a:rPr lang="en-US" sz="4800" dirty="0" err="1"/>
-              <a:t>con't</a:t>
-            </a:r>
-            <a:endParaRPr lang="en-US" sz="4800" dirty="0"/>
+              <a:t>Attention is Limited cont.</a:t>
+            </a:r>
           </a:p>
         </p:txBody>
       </p:sp>
@@ -10954,7 +11263,7 @@
         <p:spPr>
           <a:xfrm>
             <a:off x="296725" y="1608457"/>
-            <a:ext cx="9111913" cy="2646878"/>
+            <a:ext cx="9111913" cy="2105192"/>
           </a:xfrm>
           <a:prstGeom prst="rect">
             <a:avLst/>
@@ -11009,18 +11318,6 @@
               <a:buChar char="●"/>
             </a:pPr>
             <a:r>
-              <a:rPr lang="en-US" sz="2800" dirty="0" err="1">
-                <a:highlight>
-                  <a:scrgbClr r="0" g="0" b="0">
-                    <a:alpha val="0"/>
-                  </a:scrgbClr>
-                </a:highlight>
-                <a:latin typeface="Calibri" panose="020F0502020204030204" pitchFamily="34" charset="0"/>
-                <a:cs typeface="Calibri" panose="020F0502020204030204" pitchFamily="34" charset="0"/>
-              </a:rPr>
-              <a:t>Overpractice</a:t>
-            </a:r>
-            <a:r>
               <a:rPr lang="en-US" sz="2800" dirty="0">
                 <a:highlight>
                   <a:scrgbClr r="0" g="0" b="0">
@@ -11030,7 +11327,7 @@
                 <a:latin typeface="Calibri" panose="020F0502020204030204" pitchFamily="34" charset="0"/>
                 <a:cs typeface="Calibri" panose="020F0502020204030204" pitchFamily="34" charset="0"/>
               </a:rPr>
-              <a:t> simple coding exercises</a:t>
+              <a:t>Overpractice simple coding exercises</a:t>
             </a:r>
           </a:p>
           <a:p>
@@ -11087,34 +11384,6 @@
                 <a:cs typeface="Calibri" panose="020F0502020204030204" pitchFamily="34" charset="0"/>
               </a:rPr>
               <a:t>Talk out problem statement and algorithm first</a:t>
-            </a:r>
-          </a:p>
-          <a:p>
-            <a:pPr marL="91440" lvl="0" indent="-182880">
-              <a:lnSpc>
-                <a:spcPct val="90000"/>
-              </a:lnSpc>
-              <a:spcBef>
-                <a:spcPts val="1200"/>
-              </a:spcBef>
-              <a:buClr>
-                <a:schemeClr val="accent1"/>
-              </a:buClr>
-              <a:buSzPct val="45000"/>
-              <a:buFont typeface="Calibri" panose="020F0502020204030204" pitchFamily="34" charset="0"/>
-              <a:buChar char="●"/>
-            </a:pPr>
-            <a:r>
-              <a:rPr lang="en-US" sz="2800" dirty="0">
-                <a:highlight>
-                  <a:scrgbClr r="0" g="0" b="0">
-                    <a:alpha val="0"/>
-                  </a:scrgbClr>
-                </a:highlight>
-                <a:latin typeface="Calibri" panose="020F0502020204030204" pitchFamily="34" charset="0"/>
-                <a:cs typeface="Calibri" panose="020F0502020204030204" pitchFamily="34" charset="0"/>
-              </a:rPr>
-              <a:t>Start at the API and corner cases</a:t>
             </a:r>
           </a:p>
         </p:txBody>
@@ -11250,29 +11519,7 @@
             </a:r>
           </a:p>
           <a:p>
-            <a:pPr marL="221747" lvl="1" indent="0">
-              <a:buSzPct val="45000"/>
-              <a:buNone/>
-            </a:pPr>
-            <a:r>
-              <a:rPr lang="en-US" sz="2800" b="1" dirty="0">
-                <a:solidFill>
-                  <a:schemeClr val="accent1"/>
-                </a:solidFill>
-              </a:rPr>
-              <a:t>-</a:t>
-            </a:r>
-            <a:r>
-              <a:rPr lang="en-US" sz="2800" b="1" dirty="0"/>
-              <a:t> </a:t>
-            </a:r>
-            <a:r>
-              <a:rPr lang="en-US" sz="2400" dirty="0"/>
-              <a:t>Understand the basics well</a:t>
-            </a:r>
-          </a:p>
-          <a:p>
-            <a:pPr>
+            <a:pPr lvl="0">
               <a:buSzPct val="45000"/>
               <a:buFont typeface="StarSymbol"/>
               <a:buChar char="●"/>
@@ -11404,15 +11651,7 @@
             </a:pPr>
             <a:r>
               <a:rPr lang="en-US" sz="2800" dirty="0"/>
-              <a:t> </a:t>
-            </a:r>
-            <a:r>
-              <a:rPr lang="en-US" sz="2800" dirty="0" err="1"/>
-              <a:t>Overpractive</a:t>
-            </a:r>
-            <a:r>
-              <a:rPr lang="en-US" sz="2800" dirty="0"/>
-              <a:t> simpler algorithms rather than going to more complex ones.</a:t>
+              <a:t> Overpractice simpler algorithms instead of more complex ones.</a:t>
             </a:r>
           </a:p>
           <a:p>
@@ -11434,7 +11673,7 @@
             </a:pPr>
             <a:r>
               <a:rPr lang="en-US" sz="2800" dirty="0"/>
-              <a:t> Read the Java source comments</a:t>
+              <a:t> Read the Java source and comments</a:t>
             </a:r>
           </a:p>
         </p:txBody>

</xml_diff>